<commit_message>
Clear model class diagram inheritance error
</commit_message>
<xml_diff>
--- a/docs/diagrams/ModelComponentClassDiagram.pptx
+++ b/docs/diagrams/ModelComponentClassDiagram.pptx
@@ -208,7 +208,7 @@
           <a:p>
             <a:fld id="{F5CC4B3F-88C1-4FFA-B1B6-F41C21DC6924}" type="datetimeFigureOut">
               <a:rPr lang="en-US" smtClean="0"/>
-              <a:t>11/12/17</a:t>
+              <a:t>11/13/17</a:t>
             </a:fld>
             <a:endParaRPr lang="en-US"/>
           </a:p>
@@ -657,7 +657,7 @@
           <a:p>
             <a:fld id="{78C97017-6FC3-485B-9764-EAC9E56C1D49}" type="datetimeFigureOut">
               <a:rPr lang="en-US" smtClean="0"/>
-              <a:t>11/12/17</a:t>
+              <a:t>11/13/17</a:t>
             </a:fld>
             <a:endParaRPr lang="en-US"/>
           </a:p>
@@ -827,7 +827,7 @@
           <a:p>
             <a:fld id="{78C97017-6FC3-485B-9764-EAC9E56C1D49}" type="datetimeFigureOut">
               <a:rPr lang="en-US" smtClean="0"/>
-              <a:t>11/12/17</a:t>
+              <a:t>11/13/17</a:t>
             </a:fld>
             <a:endParaRPr lang="en-US"/>
           </a:p>
@@ -1007,7 +1007,7 @@
           <a:p>
             <a:fld id="{78C97017-6FC3-485B-9764-EAC9E56C1D49}" type="datetimeFigureOut">
               <a:rPr lang="en-US" smtClean="0"/>
-              <a:t>11/12/17</a:t>
+              <a:t>11/13/17</a:t>
             </a:fld>
             <a:endParaRPr lang="en-US"/>
           </a:p>
@@ -1177,7 +1177,7 @@
           <a:p>
             <a:fld id="{78C97017-6FC3-485B-9764-EAC9E56C1D49}" type="datetimeFigureOut">
               <a:rPr lang="en-US" smtClean="0"/>
-              <a:t>11/12/17</a:t>
+              <a:t>11/13/17</a:t>
             </a:fld>
             <a:endParaRPr lang="en-US"/>
           </a:p>
@@ -1423,7 +1423,7 @@
           <a:p>
             <a:fld id="{78C97017-6FC3-485B-9764-EAC9E56C1D49}" type="datetimeFigureOut">
               <a:rPr lang="en-US" smtClean="0"/>
-              <a:t>11/12/17</a:t>
+              <a:t>11/13/17</a:t>
             </a:fld>
             <a:endParaRPr lang="en-US"/>
           </a:p>
@@ -1711,7 +1711,7 @@
           <a:p>
             <a:fld id="{78C97017-6FC3-485B-9764-EAC9E56C1D49}" type="datetimeFigureOut">
               <a:rPr lang="en-US" smtClean="0"/>
-              <a:t>11/12/17</a:t>
+              <a:t>11/13/17</a:t>
             </a:fld>
             <a:endParaRPr lang="en-US"/>
           </a:p>
@@ -2133,7 +2133,7 @@
           <a:p>
             <a:fld id="{78C97017-6FC3-485B-9764-EAC9E56C1D49}" type="datetimeFigureOut">
               <a:rPr lang="en-US" smtClean="0"/>
-              <a:t>11/12/17</a:t>
+              <a:t>11/13/17</a:t>
             </a:fld>
             <a:endParaRPr lang="en-US"/>
           </a:p>
@@ -2251,7 +2251,7 @@
           <a:p>
             <a:fld id="{78C97017-6FC3-485B-9764-EAC9E56C1D49}" type="datetimeFigureOut">
               <a:rPr lang="en-US" smtClean="0"/>
-              <a:t>11/12/17</a:t>
+              <a:t>11/13/17</a:t>
             </a:fld>
             <a:endParaRPr lang="en-US"/>
           </a:p>
@@ -2346,7 +2346,7 @@
           <a:p>
             <a:fld id="{78C97017-6FC3-485B-9764-EAC9E56C1D49}" type="datetimeFigureOut">
               <a:rPr lang="en-US" smtClean="0"/>
-              <a:t>11/12/17</a:t>
+              <a:t>11/13/17</a:t>
             </a:fld>
             <a:endParaRPr lang="en-US"/>
           </a:p>
@@ -2623,7 +2623,7 @@
           <a:p>
             <a:fld id="{78C97017-6FC3-485B-9764-EAC9E56C1D49}" type="datetimeFigureOut">
               <a:rPr lang="en-US" smtClean="0"/>
-              <a:t>11/12/17</a:t>
+              <a:t>11/13/17</a:t>
             </a:fld>
             <a:endParaRPr lang="en-US"/>
           </a:p>
@@ -2876,7 +2876,7 @@
           <a:p>
             <a:fld id="{78C97017-6FC3-485B-9764-EAC9E56C1D49}" type="datetimeFigureOut">
               <a:rPr lang="en-US" smtClean="0"/>
-              <a:t>11/12/17</a:t>
+              <a:t>11/13/17</a:t>
             </a:fld>
             <a:endParaRPr lang="en-US"/>
           </a:p>
@@ -3089,7 +3089,7 @@
           <a:p>
             <a:fld id="{78C97017-6FC3-485B-9764-EAC9E56C1D49}" type="datetimeFigureOut">
               <a:rPr lang="en-US" smtClean="0"/>
-              <a:t>11/12/17</a:t>
+              <a:t>11/13/17</a:t>
             </a:fld>
             <a:endParaRPr lang="en-US"/>
           </a:p>
@@ -3472,7 +3472,7 @@
         </p:nvSpPr>
         <p:spPr>
           <a:xfrm>
-            <a:off x="454769" y="379162"/>
+            <a:off x="439578" y="386927"/>
             <a:ext cx="8689231" cy="4844659"/>
           </a:xfrm>
           <a:prstGeom prst="roundRect">
@@ -7659,9 +7659,9 @@
           <p:nvPr/>
         </p:nvSpPr>
         <p:spPr>
-          <a:xfrm rot="5400000" flipV="1">
-            <a:off x="7822608" y="3443759"/>
-            <a:ext cx="270504" cy="175523"/>
+          <a:xfrm rot="16200000" flipV="1">
+            <a:off x="8094886" y="3601703"/>
+            <a:ext cx="270504" cy="148935"/>
           </a:xfrm>
           <a:prstGeom prst="triangle">
             <a:avLst/>
@@ -7700,65 +7700,15 @@
           </a:p>
         </p:txBody>
       </p:sp>
-      <p:sp>
-        <p:nvSpPr>
-          <p:cNvPr id="94" name="Isosceles Triangle 102"/>
-          <p:cNvSpPr/>
-          <p:nvPr/>
-        </p:nvSpPr>
-        <p:spPr>
-          <a:xfrm rot="5400000" flipV="1">
-            <a:off x="7808458" y="3774909"/>
-            <a:ext cx="270504" cy="175523"/>
-          </a:xfrm>
-          <a:prstGeom prst="triangle">
-            <a:avLst/>
-          </a:prstGeom>
-          <a:ln w="19050">
-            <a:solidFill>
-              <a:srgbClr val="7030A0"/>
-            </a:solidFill>
-          </a:ln>
-          <a:effectLst/>
-        </p:spPr>
-        <p:style>
-          <a:lnRef idx="1">
-            <a:schemeClr val="accent4"/>
-          </a:lnRef>
-          <a:fillRef idx="2">
-            <a:schemeClr val="accent4"/>
-          </a:fillRef>
-          <a:effectRef idx="1">
-            <a:schemeClr val="accent4"/>
-          </a:effectRef>
-          <a:fontRef idx="minor">
-            <a:schemeClr val="dk1"/>
-          </a:fontRef>
-        </p:style>
-        <p:txBody>
-          <a:bodyPr rtlCol="0" anchor="ctr"/>
-          <a:lstStyle/>
-          <a:p>
-            <a:pPr algn="ctr"/>
-            <a:endParaRPr lang="en-SG" sz="1050" b="1">
-              <a:solidFill>
-                <a:srgbClr val="92D050"/>
-              </a:solidFill>
-            </a:endParaRPr>
-          </a:p>
-        </p:txBody>
-      </p:sp>
       <p:cxnSp>
         <p:nvCxnSpPr>
           <p:cNvPr id="95" name="Elbow Connector 63"/>
-          <p:cNvCxnSpPr>
-            <a:stCxn id="90" idx="3"/>
-          </p:cNvCxnSpPr>
+          <p:cNvCxnSpPr/>
           <p:nvPr/>
         </p:nvCxnSpPr>
         <p:spPr>
           <a:xfrm>
-            <a:off x="8045622" y="3531521"/>
+            <a:off x="7835240" y="3493996"/>
             <a:ext cx="320782" cy="195897"/>
           </a:xfrm>
           <a:prstGeom prst="bentConnector3">
@@ -7794,14 +7744,12 @@
       <p:cxnSp>
         <p:nvCxnSpPr>
           <p:cNvPr id="98" name="Elbow Connector 63"/>
-          <p:cNvCxnSpPr>
-            <a:stCxn id="94" idx="3"/>
-          </p:cNvCxnSpPr>
+          <p:cNvCxnSpPr/>
           <p:nvPr/>
         </p:nvCxnSpPr>
         <p:spPr>
           <a:xfrm flipV="1">
-            <a:off x="8031472" y="3745452"/>
+            <a:off x="7830917" y="3678341"/>
             <a:ext cx="334932" cy="117219"/>
           </a:xfrm>
           <a:prstGeom prst="bentConnector3">
@@ -7842,7 +7790,7 @@
         </p:nvSpPr>
         <p:spPr>
           <a:xfrm>
-            <a:off x="8363250" y="3576887"/>
+            <a:off x="8324774" y="3529524"/>
             <a:ext cx="763585" cy="285783"/>
           </a:xfrm>
           <a:prstGeom prst="rect">

</xml_diff>